<commit_message>
Slides cours 3 - v0
</commit_message>
<xml_diff>
--- a/slides/3_model-endpoints/3-Train and deploy ML models.pptx
+++ b/slides/3_model-endpoints/3-Train and deploy ML models.pptx
@@ -5,11 +5,17 @@
     <p:sldMasterId id="2147483702" r:id="rId1"/>
   </p:sldMasterIdLst>
   <p:notesMasterIdLst>
-    <p:notesMasterId r:id="rId4"/>
+    <p:notesMasterId r:id="rId10"/>
   </p:notesMasterIdLst>
   <p:sldIdLst>
     <p:sldId id="256" r:id="rId2"/>
     <p:sldId id="257" r:id="rId3"/>
+    <p:sldId id="264" r:id="rId4"/>
+    <p:sldId id="263" r:id="rId5"/>
+    <p:sldId id="259" r:id="rId6"/>
+    <p:sldId id="258" r:id="rId7"/>
+    <p:sldId id="262" r:id="rId8"/>
+    <p:sldId id="261" r:id="rId9"/>
   </p:sldIdLst>
   <p:sldSz cx="12192000" cy="6858000"/>
   <p:notesSz cx="6735763" cy="9866313"/>
@@ -201,7 +207,7 @@
           <a:p>
             <a:fld id="{9357E7CD-833A-4057-A34F-721214C10A5F}" type="datetimeFigureOut">
               <a:rPr lang="fr-FR" smtClean="0"/>
-              <a:t>11/02/2025</a:t>
+              <a:t>14/02/2025</a:t>
             </a:fld>
             <a:endParaRPr lang="fr-FR"/>
           </a:p>
@@ -12693,7 +12699,11 @@
           <a:bodyPr/>
           <a:lstStyle/>
           <a:p>
-            <a:endParaRPr lang="fr-FR"/>
+            <a:r>
+              <a:rPr lang="fr-FR" dirty="0" smtClean="0"/>
+              <a:t>03</a:t>
+            </a:r>
+            <a:endParaRPr lang="fr-FR" dirty="0"/>
           </a:p>
         </p:txBody>
       </p:sp>
@@ -12712,7 +12722,11 @@
           <a:bodyPr/>
           <a:lstStyle/>
           <a:p>
-            <a:endParaRPr lang="fr-FR"/>
+            <a:r>
+              <a:rPr lang="fr-FR" dirty="0" smtClean="0"/>
+              <a:t>02</a:t>
+            </a:r>
+            <a:endParaRPr lang="fr-FR" dirty="0"/>
           </a:p>
         </p:txBody>
       </p:sp>
@@ -12775,7 +12789,7 @@
           <a:p>
             <a:r>
               <a:rPr lang="fr-FR" dirty="0" smtClean="0"/>
-              <a:t>Créer et entrainer un modèle personnalisé</a:t>
+              <a:t>Docker</a:t>
             </a:r>
             <a:endParaRPr lang="fr-FR" dirty="0"/>
           </a:p>
@@ -12798,7 +12812,7 @@
           <a:p>
             <a:r>
               <a:rPr lang="fr-FR" dirty="0" smtClean="0"/>
-              <a:t>Inférence par batch</a:t>
+              <a:t>Tache d’entrainement</a:t>
             </a:r>
             <a:endParaRPr lang="fr-FR" dirty="0"/>
           </a:p>
@@ -12896,7 +12910,11 @@
           <a:bodyPr/>
           <a:lstStyle/>
           <a:p>
-            <a:endParaRPr lang="fr-FR"/>
+            <a:r>
+              <a:rPr lang="fr-FR" dirty="0" smtClean="0"/>
+              <a:t>01</a:t>
+            </a:r>
+            <a:endParaRPr lang="fr-FR" dirty="0"/>
           </a:p>
         </p:txBody>
       </p:sp>
@@ -12915,7 +12933,11 @@
           <a:bodyPr/>
           <a:lstStyle/>
           <a:p>
-            <a:endParaRPr lang="fr-FR"/>
+            <a:r>
+              <a:rPr lang="fr-FR" dirty="0" smtClean="0"/>
+              <a:t>06</a:t>
+            </a:r>
+            <a:endParaRPr lang="fr-FR" dirty="0"/>
           </a:p>
         </p:txBody>
       </p:sp>
@@ -12934,7 +12956,11 @@
           <a:bodyPr/>
           <a:lstStyle/>
           <a:p>
-            <a:endParaRPr lang="fr-FR"/>
+            <a:r>
+              <a:rPr lang="fr-FR" dirty="0" smtClean="0"/>
+              <a:t>05</a:t>
+            </a:r>
+            <a:endParaRPr lang="fr-FR" dirty="0"/>
           </a:p>
         </p:txBody>
       </p:sp>
@@ -12954,8 +12980,8 @@
           <a:lstStyle/>
           <a:p>
             <a:r>
-              <a:rPr lang="fr-FR" dirty="0" smtClean="0"/>
-              <a:t>Inférence en streaming</a:t>
+              <a:rPr lang="fr-FR" dirty="0"/>
+              <a:t>Inférence par batch vs streaming</a:t>
             </a:r>
             <a:endParaRPr lang="fr-FR" dirty="0"/>
           </a:p>
@@ -12977,8 +13003,8 @@
           <a:lstStyle/>
           <a:p>
             <a:r>
-              <a:rPr lang="fr-FR" dirty="0" err="1" smtClean="0"/>
-              <a:t>Scalabilité</a:t>
+              <a:rPr lang="fr-FR" dirty="0" smtClean="0"/>
+              <a:t>Dimensionnement</a:t>
             </a:r>
             <a:endParaRPr lang="fr-FR" dirty="0"/>
           </a:p>
@@ -13000,13 +13026,16 @@
           <a:lstStyle/>
           <a:p>
             <a:r>
-              <a:rPr lang="fr-FR" dirty="0" smtClean="0"/>
+              <a:rPr lang="fr-FR" dirty="0"/>
               <a:t>A/B </a:t>
             </a:r>
             <a:r>
-              <a:rPr lang="fr-FR" dirty="0" err="1" smtClean="0"/>
+              <a:rPr lang="fr-FR" dirty="0" err="1"/>
               <a:t>testing</a:t>
             </a:r>
+            <a:endParaRPr lang="fr-FR" dirty="0"/>
+          </a:p>
+          <a:p>
             <a:endParaRPr lang="fr-FR" dirty="0"/>
           </a:p>
         </p:txBody>
@@ -13050,20 +13079,12 @@
           <a:lstStyle/>
           <a:p>
             <a:r>
-              <a:rPr lang="fr-FR" dirty="0" smtClean="0"/>
-              <a:t>Problème de saturation d’un </a:t>
-            </a:r>
-            <a:r>
-              <a:rPr lang="fr-FR" dirty="0" err="1" smtClean="0"/>
+              <a:rPr lang="fr-FR" dirty="0"/>
+              <a:t>Déployer plusieurs modèles sur un même </a:t>
+            </a:r>
+            <a:r>
+              <a:rPr lang="fr-FR" dirty="0" err="1"/>
               <a:t>endpoint</a:t>
-            </a:r>
-            <a:r>
-              <a:rPr lang="fr-FR" dirty="0" smtClean="0"/>
-              <a:t> en streaming, présentation de </a:t>
-            </a:r>
-            <a:r>
-              <a:rPr lang="fr-FR" dirty="0" err="1" smtClean="0"/>
-              <a:t>locust</a:t>
             </a:r>
             <a:endParaRPr lang="fr-FR" dirty="0"/>
           </a:p>
@@ -13084,14 +13105,6 @@
           <a:bodyPr/>
           <a:lstStyle/>
           <a:p>
-            <a:r>
-              <a:rPr lang="fr-FR" dirty="0" smtClean="0"/>
-              <a:t>Déployer plusieurs modèles sur un même </a:t>
-            </a:r>
-            <a:r>
-              <a:rPr lang="fr-FR" dirty="0" err="1" smtClean="0"/>
-              <a:t>endpoint</a:t>
-            </a:r>
             <a:endParaRPr lang="fr-FR" dirty="0"/>
           </a:p>
         </p:txBody>
@@ -13111,7 +13124,11 @@
           <a:bodyPr/>
           <a:lstStyle/>
           <a:p>
-            <a:endParaRPr lang="fr-FR"/>
+            <a:r>
+              <a:rPr lang="fr-FR" dirty="0" smtClean="0"/>
+              <a:t>04</a:t>
+            </a:r>
+            <a:endParaRPr lang="fr-FR" dirty="0"/>
           </a:p>
         </p:txBody>
       </p:sp>
@@ -13160,8 +13177,16 @@
           <a:lstStyle/>
           <a:p>
             <a:r>
-              <a:rPr lang="en-US" smtClean="0"/>
-              <a:t>2024 | ©HeadMind Partners</a:t>
+              <a:rPr lang="en-US" dirty="0" smtClean="0"/>
+              <a:t>2024 | ©</a:t>
+            </a:r>
+            <a:r>
+              <a:rPr lang="en-US" dirty="0" err="1" smtClean="0"/>
+              <a:t>HeadMind</a:t>
+            </a:r>
+            <a:r>
+              <a:rPr lang="en-US" dirty="0" smtClean="0"/>
+              <a:t> Partners</a:t>
             </a:r>
             <a:endParaRPr lang="fr-FR" dirty="0"/>
           </a:p>
@@ -13171,6 +13196,1356 @@
     <p:extLst>
       <p:ext uri="{BB962C8B-B14F-4D97-AF65-F5344CB8AC3E}">
         <p14:creationId xmlns:p14="http://schemas.microsoft.com/office/powerpoint/2010/main" val="3390596514"/>
+      </p:ext>
+    </p:extLst>
+  </p:cSld>
+  <p:clrMapOvr>
+    <a:masterClrMapping/>
+  </p:clrMapOvr>
+</p:sld>
+</file>
+
+<file path=ppt/slides/slide3.xml><?xml version="1.0" encoding="utf-8"?>
+<p:sld xmlns:a="http://schemas.openxmlformats.org/drawingml/2006/main" xmlns:r="http://schemas.openxmlformats.org/officeDocument/2006/relationships" xmlns:p="http://schemas.openxmlformats.org/presentationml/2006/main">
+  <p:cSld>
+    <p:spTree>
+      <p:nvGrpSpPr>
+        <p:cNvPr id="1" name=""/>
+        <p:cNvGrpSpPr/>
+        <p:nvPr/>
+      </p:nvGrpSpPr>
+      <p:grpSpPr>
+        <a:xfrm>
+          <a:off x="0" y="0"/>
+          <a:ext cx="0" cy="0"/>
+          <a:chOff x="0" y="0"/>
+          <a:chExt cx="0" cy="0"/>
+        </a:xfrm>
+      </p:grpSpPr>
+      <p:sp>
+        <p:nvSpPr>
+          <p:cNvPr id="2" name="Titre 1"/>
+          <p:cNvSpPr>
+            <a:spLocks noGrp="1"/>
+          </p:cNvSpPr>
+          <p:nvPr>
+            <p:ph type="title"/>
+          </p:nvPr>
+        </p:nvSpPr>
+        <p:spPr/>
+        <p:txBody>
+          <a:bodyPr/>
+          <a:lstStyle/>
+          <a:p>
+            <a:r>
+              <a:rPr lang="fr-FR" dirty="0" smtClean="0"/>
+              <a:t>Docker</a:t>
+            </a:r>
+            <a:endParaRPr lang="fr-FR" dirty="0"/>
+          </a:p>
+        </p:txBody>
+      </p:sp>
+      <p:sp>
+        <p:nvSpPr>
+          <p:cNvPr id="4" name="Espace réservé du numéro de diapositive 3"/>
+          <p:cNvSpPr>
+            <a:spLocks noGrp="1"/>
+          </p:cNvSpPr>
+          <p:nvPr>
+            <p:ph type="sldNum" sz="quarter" idx="4"/>
+          </p:nvPr>
+        </p:nvSpPr>
+        <p:spPr/>
+        <p:txBody>
+          <a:bodyPr/>
+          <a:lstStyle/>
+          <a:p>
+            <a:pPr>
+              <a:defRPr/>
+            </a:pPr>
+            <a:fld id="{F4FEB08F-923E-484A-9FC5-0AA7BDA29BD6}" type="slidenum">
+              <a:rPr lang="fr-FR" smtClean="0"/>
+              <a:pPr>
+                <a:defRPr/>
+              </a:pPr>
+              <a:t>3</a:t>
+            </a:fld>
+            <a:endParaRPr lang="fr-FR" dirty="0"/>
+          </a:p>
+        </p:txBody>
+      </p:sp>
+      <p:sp>
+        <p:nvSpPr>
+          <p:cNvPr id="5" name="Espace réservé du pied de page 4"/>
+          <p:cNvSpPr>
+            <a:spLocks noGrp="1"/>
+          </p:cNvSpPr>
+          <p:nvPr>
+            <p:ph type="ftr" sz="quarter" idx="3"/>
+          </p:nvPr>
+        </p:nvSpPr>
+        <p:spPr/>
+        <p:txBody>
+          <a:bodyPr/>
+          <a:lstStyle/>
+          <a:p>
+            <a:r>
+              <a:rPr lang="en-US" smtClean="0"/>
+              <a:t>2024 | ©HeadMind Partners</a:t>
+            </a:r>
+            <a:endParaRPr lang="fr-FR" dirty="0"/>
+          </a:p>
+        </p:txBody>
+      </p:sp>
+      <p:pic>
+        <p:nvPicPr>
+          <p:cNvPr id="2050" name="Picture 2" descr="Docker - au revoir les VMs, bonjour les containers - Le weblogue de SeB"/>
+          <p:cNvPicPr>
+            <a:picLocks noChangeAspect="1" noChangeArrowheads="1"/>
+          </p:cNvPicPr>
+          <p:nvPr/>
+        </p:nvPicPr>
+        <p:blipFill>
+          <a:blip r:embed="rId2" cstate="print">
+            <a:extLst>
+              <a:ext uri="{28A0092B-C50C-407E-A947-70E740481C1C}">
+                <a14:useLocalDpi xmlns:a14="http://schemas.microsoft.com/office/drawing/2010/main" val="0"/>
+              </a:ext>
+            </a:extLst>
+          </a:blip>
+          <a:srcRect/>
+          <a:stretch>
+            <a:fillRect/>
+          </a:stretch>
+        </p:blipFill>
+        <p:spPr bwMode="auto">
+          <a:xfrm>
+            <a:off x="10475143" y="68445"/>
+            <a:ext cx="1189476" cy="984291"/>
+          </a:xfrm>
+          <a:prstGeom prst="rect">
+            <a:avLst/>
+          </a:prstGeom>
+          <a:noFill/>
+          <a:extLst>
+            <a:ext uri="{909E8E84-426E-40DD-AFC4-6F175D3DCCD1}">
+              <a14:hiddenFill xmlns:a14="http://schemas.microsoft.com/office/drawing/2010/main">
+                <a:solidFill>
+                  <a:srgbClr val="FFFFFF"/>
+                </a:solidFill>
+              </a14:hiddenFill>
+            </a:ext>
+          </a:extLst>
+        </p:spPr>
+      </p:pic>
+      <p:pic>
+        <p:nvPicPr>
+          <p:cNvPr id="2052" name="Picture 4" descr="What is a Container? | Docker"/>
+          <p:cNvPicPr>
+            <a:picLocks noChangeAspect="1" noChangeArrowheads="1"/>
+          </p:cNvPicPr>
+          <p:nvPr/>
+        </p:nvPicPr>
+        <p:blipFill>
+          <a:blip r:embed="rId3">
+            <a:extLst>
+              <a:ext uri="{28A0092B-C50C-407E-A947-70E740481C1C}">
+                <a14:useLocalDpi xmlns:a14="http://schemas.microsoft.com/office/drawing/2010/main" val="0"/>
+              </a:ext>
+            </a:extLst>
+          </a:blip>
+          <a:srcRect/>
+          <a:stretch>
+            <a:fillRect/>
+          </a:stretch>
+        </p:blipFill>
+        <p:spPr bwMode="auto">
+          <a:xfrm>
+            <a:off x="3030416" y="1824950"/>
+            <a:ext cx="8762710" cy="3583770"/>
+          </a:xfrm>
+          <a:prstGeom prst="rect">
+            <a:avLst/>
+          </a:prstGeom>
+          <a:noFill/>
+          <a:extLst>
+            <a:ext uri="{909E8E84-426E-40DD-AFC4-6F175D3DCCD1}">
+              <a14:hiddenFill xmlns:a14="http://schemas.microsoft.com/office/drawing/2010/main">
+                <a:solidFill>
+                  <a:srgbClr val="FFFFFF"/>
+                </a:solidFill>
+              </a14:hiddenFill>
+            </a:ext>
+          </a:extLst>
+        </p:spPr>
+      </p:pic>
+      <p:pic>
+        <p:nvPicPr>
+          <p:cNvPr id="2056" name="Picture 8" descr="and that's when Docker happened... : r/ProgrammerHumor"/>
+          <p:cNvPicPr>
+            <a:picLocks noChangeAspect="1" noChangeArrowheads="1"/>
+          </p:cNvPicPr>
+          <p:nvPr/>
+        </p:nvPicPr>
+        <p:blipFill>
+          <a:blip r:embed="rId4">
+            <a:extLst>
+              <a:ext uri="{28A0092B-C50C-407E-A947-70E740481C1C}">
+                <a14:useLocalDpi xmlns:a14="http://schemas.microsoft.com/office/drawing/2010/main" val="0"/>
+              </a:ext>
+            </a:extLst>
+          </a:blip>
+          <a:srcRect/>
+          <a:stretch>
+            <a:fillRect/>
+          </a:stretch>
+        </p:blipFill>
+        <p:spPr bwMode="auto">
+          <a:xfrm>
+            <a:off x="194408" y="2480877"/>
+            <a:ext cx="2558750" cy="2271916"/>
+          </a:xfrm>
+          <a:prstGeom prst="rect">
+            <a:avLst/>
+          </a:prstGeom>
+          <a:noFill/>
+          <a:extLst>
+            <a:ext uri="{909E8E84-426E-40DD-AFC4-6F175D3DCCD1}">
+              <a14:hiddenFill xmlns:a14="http://schemas.microsoft.com/office/drawing/2010/main">
+                <a:solidFill>
+                  <a:srgbClr val="FFFFFF"/>
+                </a:solidFill>
+              </a14:hiddenFill>
+            </a:ext>
+          </a:extLst>
+        </p:spPr>
+      </p:pic>
+    </p:spTree>
+    <p:extLst>
+      <p:ext uri="{BB962C8B-B14F-4D97-AF65-F5344CB8AC3E}">
+        <p14:creationId xmlns:p14="http://schemas.microsoft.com/office/powerpoint/2010/main" val="2897335791"/>
+      </p:ext>
+    </p:extLst>
+  </p:cSld>
+  <p:clrMapOvr>
+    <a:masterClrMapping/>
+  </p:clrMapOvr>
+</p:sld>
+</file>
+
+<file path=ppt/slides/slide4.xml><?xml version="1.0" encoding="utf-8"?>
+<p:sld xmlns:a="http://schemas.openxmlformats.org/drawingml/2006/main" xmlns:r="http://schemas.openxmlformats.org/officeDocument/2006/relationships" xmlns:p="http://schemas.openxmlformats.org/presentationml/2006/main">
+  <p:cSld>
+    <p:spTree>
+      <p:nvGrpSpPr>
+        <p:cNvPr id="1" name=""/>
+        <p:cNvGrpSpPr/>
+        <p:nvPr/>
+      </p:nvGrpSpPr>
+      <p:grpSpPr>
+        <a:xfrm>
+          <a:off x="0" y="0"/>
+          <a:ext cx="0" cy="0"/>
+          <a:chOff x="0" y="0"/>
+          <a:chExt cx="0" cy="0"/>
+        </a:xfrm>
+      </p:grpSpPr>
+      <p:sp>
+        <p:nvSpPr>
+          <p:cNvPr id="2" name="Titre 1"/>
+          <p:cNvSpPr>
+            <a:spLocks noGrp="1"/>
+          </p:cNvSpPr>
+          <p:nvPr>
+            <p:ph type="title"/>
+          </p:nvPr>
+        </p:nvSpPr>
+        <p:spPr/>
+        <p:txBody>
+          <a:bodyPr/>
+          <a:lstStyle/>
+          <a:p>
+            <a:r>
+              <a:rPr lang="fr-FR" dirty="0" smtClean="0"/>
+              <a:t>Tache d’entrainement</a:t>
+            </a:r>
+            <a:endParaRPr lang="fr-FR" dirty="0"/>
+          </a:p>
+        </p:txBody>
+      </p:sp>
+      <p:sp>
+        <p:nvSpPr>
+          <p:cNvPr id="3" name="Espace réservé du texte 2"/>
+          <p:cNvSpPr>
+            <a:spLocks noGrp="1"/>
+          </p:cNvSpPr>
+          <p:nvPr>
+            <p:ph type="body" sz="quarter" idx="14"/>
+          </p:nvPr>
+        </p:nvSpPr>
+        <p:spPr/>
+        <p:txBody>
+          <a:bodyPr/>
+          <a:lstStyle/>
+          <a:p>
+            <a:endParaRPr lang="fr-FR"/>
+          </a:p>
+        </p:txBody>
+      </p:sp>
+      <p:sp>
+        <p:nvSpPr>
+          <p:cNvPr id="4" name="Espace réservé du numéro de diapositive 3"/>
+          <p:cNvSpPr>
+            <a:spLocks noGrp="1"/>
+          </p:cNvSpPr>
+          <p:nvPr>
+            <p:ph type="sldNum" sz="quarter" idx="4"/>
+          </p:nvPr>
+        </p:nvSpPr>
+        <p:spPr/>
+        <p:txBody>
+          <a:bodyPr/>
+          <a:lstStyle/>
+          <a:p>
+            <a:pPr>
+              <a:defRPr/>
+            </a:pPr>
+            <a:fld id="{F4FEB08F-923E-484A-9FC5-0AA7BDA29BD6}" type="slidenum">
+              <a:rPr lang="fr-FR" smtClean="0"/>
+              <a:pPr>
+                <a:defRPr/>
+              </a:pPr>
+              <a:t>4</a:t>
+            </a:fld>
+            <a:endParaRPr lang="fr-FR" dirty="0"/>
+          </a:p>
+        </p:txBody>
+      </p:sp>
+      <p:sp>
+        <p:nvSpPr>
+          <p:cNvPr id="5" name="Espace réservé du pied de page 4"/>
+          <p:cNvSpPr>
+            <a:spLocks noGrp="1"/>
+          </p:cNvSpPr>
+          <p:nvPr>
+            <p:ph type="ftr" sz="quarter" idx="3"/>
+          </p:nvPr>
+        </p:nvSpPr>
+        <p:spPr/>
+        <p:txBody>
+          <a:bodyPr/>
+          <a:lstStyle/>
+          <a:p>
+            <a:r>
+              <a:rPr lang="en-US" smtClean="0"/>
+              <a:t>2024 | ©HeadMind Partners</a:t>
+            </a:r>
+            <a:endParaRPr lang="fr-FR" dirty="0"/>
+          </a:p>
+        </p:txBody>
+      </p:sp>
+    </p:spTree>
+    <p:extLst>
+      <p:ext uri="{BB962C8B-B14F-4D97-AF65-F5344CB8AC3E}">
+        <p14:creationId xmlns:p14="http://schemas.microsoft.com/office/powerpoint/2010/main" val="4014395332"/>
+      </p:ext>
+    </p:extLst>
+  </p:cSld>
+  <p:clrMapOvr>
+    <a:masterClrMapping/>
+  </p:clrMapOvr>
+</p:sld>
+</file>
+
+<file path=ppt/slides/slide5.xml><?xml version="1.0" encoding="utf-8"?>
+<p:sld xmlns:a="http://schemas.openxmlformats.org/drawingml/2006/main" xmlns:r="http://schemas.openxmlformats.org/officeDocument/2006/relationships" xmlns:p="http://schemas.openxmlformats.org/presentationml/2006/main">
+  <p:cSld>
+    <p:spTree>
+      <p:nvGrpSpPr>
+        <p:cNvPr id="1" name=""/>
+        <p:cNvGrpSpPr/>
+        <p:nvPr/>
+      </p:nvGrpSpPr>
+      <p:grpSpPr>
+        <a:xfrm>
+          <a:off x="0" y="0"/>
+          <a:ext cx="0" cy="0"/>
+          <a:chOff x="0" y="0"/>
+          <a:chExt cx="0" cy="0"/>
+        </a:xfrm>
+      </p:grpSpPr>
+      <p:sp>
+        <p:nvSpPr>
+          <p:cNvPr id="2" name="Titre 1"/>
+          <p:cNvSpPr>
+            <a:spLocks noGrp="1"/>
+          </p:cNvSpPr>
+          <p:nvPr>
+            <p:ph type="title"/>
+          </p:nvPr>
+        </p:nvSpPr>
+        <p:spPr/>
+        <p:txBody>
+          <a:bodyPr/>
+          <a:lstStyle/>
+          <a:p>
+            <a:r>
+              <a:rPr lang="fr-FR" dirty="0" smtClean="0"/>
+              <a:t>Batch vs Streaming</a:t>
+            </a:r>
+            <a:endParaRPr lang="fr-FR" dirty="0"/>
+          </a:p>
+        </p:txBody>
+      </p:sp>
+      <p:sp>
+        <p:nvSpPr>
+          <p:cNvPr id="3" name="Espace réservé du numéro de diapositive 2"/>
+          <p:cNvSpPr>
+            <a:spLocks noGrp="1"/>
+          </p:cNvSpPr>
+          <p:nvPr>
+            <p:ph type="sldNum" sz="quarter" idx="4"/>
+          </p:nvPr>
+        </p:nvSpPr>
+        <p:spPr/>
+        <p:txBody>
+          <a:bodyPr/>
+          <a:lstStyle/>
+          <a:p>
+            <a:pPr>
+              <a:defRPr/>
+            </a:pPr>
+            <a:fld id="{F4FEB08F-923E-484A-9FC5-0AA7BDA29BD6}" type="slidenum">
+              <a:rPr lang="fr-FR" smtClean="0"/>
+              <a:pPr>
+                <a:defRPr/>
+              </a:pPr>
+              <a:t>5</a:t>
+            </a:fld>
+            <a:endParaRPr lang="fr-FR" dirty="0"/>
+          </a:p>
+        </p:txBody>
+      </p:sp>
+      <p:sp>
+        <p:nvSpPr>
+          <p:cNvPr id="4" name="Espace réservé du pied de page 3"/>
+          <p:cNvSpPr>
+            <a:spLocks noGrp="1"/>
+          </p:cNvSpPr>
+          <p:nvPr>
+            <p:ph type="ftr" sz="quarter" idx="3"/>
+          </p:nvPr>
+        </p:nvSpPr>
+        <p:spPr/>
+        <p:txBody>
+          <a:bodyPr/>
+          <a:lstStyle/>
+          <a:p>
+            <a:r>
+              <a:rPr lang="en-US" smtClean="0"/>
+              <a:t>2024 | ©HeadMind Partners</a:t>
+            </a:r>
+            <a:endParaRPr lang="fr-FR" dirty="0"/>
+          </a:p>
+        </p:txBody>
+      </p:sp>
+      <p:sp>
+        <p:nvSpPr>
+          <p:cNvPr id="5" name="Espace réservé du texte 4"/>
+          <p:cNvSpPr>
+            <a:spLocks noGrp="1"/>
+          </p:cNvSpPr>
+          <p:nvPr>
+            <p:ph type="body" sz="quarter" idx="13"/>
+          </p:nvPr>
+        </p:nvSpPr>
+        <p:spPr>
+          <a:xfrm>
+            <a:off x="818228" y="2189022"/>
+            <a:ext cx="4557487" cy="3788266"/>
+          </a:xfrm>
+        </p:spPr>
+        <p:txBody>
+          <a:bodyPr/>
+          <a:lstStyle/>
+          <a:p>
+            <a:r>
+              <a:rPr lang="fr-FR" dirty="0"/>
+              <a:t>Idée : traiter de grande quantité de données en parallélisant les calculs notamment à l’aide de GPU</a:t>
+            </a:r>
+            <a:r>
+              <a:rPr lang="fr-FR" dirty="0" smtClean="0"/>
+              <a:t>.</a:t>
+            </a:r>
+          </a:p>
+          <a:p>
+            <a:endParaRPr lang="fr-FR" dirty="0"/>
+          </a:p>
+          <a:p>
+            <a:pPr marL="285750" indent="-285750">
+              <a:buFontTx/>
+              <a:buChar char="-"/>
+            </a:pPr>
+            <a:r>
+              <a:rPr lang="fr-FR" dirty="0"/>
+              <a:t>Accélère le traitement de données et optimise l’utilisation des ressources de calculs ce qui réduit les coûts </a:t>
+            </a:r>
+            <a:r>
+              <a:rPr lang="fr-FR" dirty="0" smtClean="0"/>
+              <a:t>d’utilisation</a:t>
+            </a:r>
+          </a:p>
+          <a:p>
+            <a:pPr marL="285750" indent="-285750">
+              <a:buFontTx/>
+              <a:buChar char="-"/>
+            </a:pPr>
+            <a:r>
+              <a:rPr lang="fr-FR" dirty="0" smtClean="0"/>
+              <a:t>Entraine des latences à l’inférence.</a:t>
+            </a:r>
+            <a:endParaRPr lang="fr-FR" dirty="0"/>
+          </a:p>
+          <a:p>
+            <a:endParaRPr lang="fr-FR" dirty="0" smtClean="0"/>
+          </a:p>
+          <a:p>
+            <a:endParaRPr lang="fr-FR" dirty="0" smtClean="0"/>
+          </a:p>
+          <a:p>
+            <a:pPr marL="285750" indent="-285750">
+              <a:buFontTx/>
+              <a:buChar char="-"/>
+            </a:pPr>
+            <a:endParaRPr lang="fr-FR" dirty="0" smtClean="0"/>
+          </a:p>
+          <a:p>
+            <a:r>
+              <a:rPr lang="fr-FR" dirty="0" smtClean="0"/>
+              <a:t>Exemple : </a:t>
+            </a:r>
+          </a:p>
+          <a:p>
+            <a:r>
+              <a:rPr lang="fr-FR" dirty="0" smtClean="0"/>
+              <a:t>Classification d’images, </a:t>
+            </a:r>
+            <a:r>
+              <a:rPr lang="fr-FR" dirty="0" smtClean="0"/>
+              <a:t>réglage d’</a:t>
+            </a:r>
+            <a:r>
+              <a:rPr lang="fr-FR" dirty="0" err="1" smtClean="0"/>
+              <a:t>hyperparamètres</a:t>
+            </a:r>
+            <a:endParaRPr lang="fr-FR" dirty="0"/>
+          </a:p>
+        </p:txBody>
+      </p:sp>
+      <p:sp>
+        <p:nvSpPr>
+          <p:cNvPr id="6" name="Espace réservé du texte 5"/>
+          <p:cNvSpPr>
+            <a:spLocks noGrp="1"/>
+          </p:cNvSpPr>
+          <p:nvPr>
+            <p:ph type="body" sz="quarter" idx="18"/>
+          </p:nvPr>
+        </p:nvSpPr>
+        <p:spPr/>
+        <p:txBody>
+          <a:bodyPr/>
+          <a:lstStyle/>
+          <a:p>
+            <a:r>
+              <a:rPr lang="fr-FR" dirty="0"/>
+              <a:t>Inférence en batch</a:t>
+            </a:r>
+          </a:p>
+        </p:txBody>
+      </p:sp>
+      <p:sp>
+        <p:nvSpPr>
+          <p:cNvPr id="7" name="Espace réservé du texte 6"/>
+          <p:cNvSpPr>
+            <a:spLocks noGrp="1"/>
+          </p:cNvSpPr>
+          <p:nvPr>
+            <p:ph type="body" sz="quarter" idx="19"/>
+          </p:nvPr>
+        </p:nvSpPr>
+        <p:spPr/>
+        <p:txBody>
+          <a:bodyPr/>
+          <a:lstStyle/>
+          <a:p>
+            <a:r>
+              <a:rPr lang="fr-FR" dirty="0" smtClean="0"/>
+              <a:t>Idée : traiter les données en temps réel au fur et à mesure qu’elles sont collectées.</a:t>
+            </a:r>
+          </a:p>
+          <a:p>
+            <a:endParaRPr lang="fr-FR" dirty="0" smtClean="0"/>
+          </a:p>
+          <a:p>
+            <a:pPr marL="285750" indent="-285750">
+              <a:buFontTx/>
+              <a:buChar char="-"/>
+            </a:pPr>
+            <a:r>
+              <a:rPr lang="fr-FR" dirty="0" smtClean="0"/>
+              <a:t>Temps réel</a:t>
+            </a:r>
+          </a:p>
+          <a:p>
+            <a:pPr marL="285750" indent="-285750">
+              <a:buFontTx/>
+              <a:buChar char="-"/>
+            </a:pPr>
+            <a:r>
+              <a:rPr lang="fr-FR" dirty="0" smtClean="0"/>
+              <a:t>Nécessite une pipeline de </a:t>
+            </a:r>
+            <a:r>
+              <a:rPr lang="fr-FR" dirty="0" err="1" smtClean="0"/>
+              <a:t>préprocessing</a:t>
+            </a:r>
+            <a:r>
+              <a:rPr lang="fr-FR" dirty="0" smtClean="0"/>
+              <a:t> </a:t>
+            </a:r>
+            <a:r>
+              <a:rPr lang="fr-FR" dirty="0" smtClean="0"/>
+              <a:t>efficace</a:t>
+            </a:r>
+          </a:p>
+          <a:p>
+            <a:pPr marL="285750" indent="-285750">
+              <a:buFontTx/>
+              <a:buChar char="-"/>
+            </a:pPr>
+            <a:r>
+              <a:rPr lang="fr-FR" dirty="0" smtClean="0"/>
+              <a:t>L’exigence de temps réel ou quasi-réel limite la complexité des modèles à utiliser.</a:t>
+            </a:r>
+          </a:p>
+          <a:p>
+            <a:pPr marL="285750" indent="-285750">
+              <a:buFontTx/>
+              <a:buChar char="-"/>
+            </a:pPr>
+            <a:endParaRPr lang="fr-FR" dirty="0"/>
+          </a:p>
+          <a:p>
+            <a:pPr marL="285750" indent="-285750">
+              <a:buFontTx/>
+              <a:buChar char="-"/>
+            </a:pPr>
+            <a:endParaRPr lang="fr-FR" dirty="0" smtClean="0"/>
+          </a:p>
+          <a:p>
+            <a:pPr marL="285750" indent="-285750">
+              <a:buFontTx/>
+              <a:buChar char="-"/>
+            </a:pPr>
+            <a:endParaRPr lang="fr-FR" dirty="0"/>
+          </a:p>
+          <a:p>
+            <a:r>
+              <a:rPr lang="fr-FR" dirty="0" smtClean="0"/>
+              <a:t>Exemple :</a:t>
+            </a:r>
+          </a:p>
+          <a:p>
+            <a:r>
+              <a:rPr lang="fr-FR" dirty="0" smtClean="0"/>
+              <a:t>Système de recommandation, détection d’anomalies</a:t>
+            </a:r>
+            <a:endParaRPr lang="fr-FR" dirty="0"/>
+          </a:p>
+        </p:txBody>
+      </p:sp>
+      <p:sp>
+        <p:nvSpPr>
+          <p:cNvPr id="8" name="Espace réservé du texte 7"/>
+          <p:cNvSpPr>
+            <a:spLocks noGrp="1"/>
+          </p:cNvSpPr>
+          <p:nvPr>
+            <p:ph type="body" sz="quarter" idx="20"/>
+          </p:nvPr>
+        </p:nvSpPr>
+        <p:spPr/>
+        <p:txBody>
+          <a:bodyPr/>
+          <a:lstStyle/>
+          <a:p>
+            <a:r>
+              <a:rPr lang="fr-FR" dirty="0" smtClean="0"/>
+              <a:t>Streaming sur un </a:t>
+            </a:r>
+            <a:r>
+              <a:rPr lang="fr-FR" dirty="0" err="1" smtClean="0"/>
+              <a:t>endpoint</a:t>
+            </a:r>
+            <a:endParaRPr lang="fr-FR" dirty="0"/>
+          </a:p>
+        </p:txBody>
+      </p:sp>
+    </p:spTree>
+    <p:extLst>
+      <p:ext uri="{BB962C8B-B14F-4D97-AF65-F5344CB8AC3E}">
+        <p14:creationId xmlns:p14="http://schemas.microsoft.com/office/powerpoint/2010/main" val="379505522"/>
+      </p:ext>
+    </p:extLst>
+  </p:cSld>
+  <p:clrMapOvr>
+    <a:masterClrMapping/>
+  </p:clrMapOvr>
+</p:sld>
+</file>
+
+<file path=ppt/slides/slide6.xml><?xml version="1.0" encoding="utf-8"?>
+<p:sld xmlns:a="http://schemas.openxmlformats.org/drawingml/2006/main" xmlns:r="http://schemas.openxmlformats.org/officeDocument/2006/relationships" xmlns:p="http://schemas.openxmlformats.org/presentationml/2006/main">
+  <p:cSld>
+    <p:spTree>
+      <p:nvGrpSpPr>
+        <p:cNvPr id="1" name=""/>
+        <p:cNvGrpSpPr/>
+        <p:nvPr/>
+      </p:nvGrpSpPr>
+      <p:grpSpPr>
+        <a:xfrm>
+          <a:off x="0" y="0"/>
+          <a:ext cx="0" cy="0"/>
+          <a:chOff x="0" y="0"/>
+          <a:chExt cx="0" cy="0"/>
+        </a:xfrm>
+      </p:grpSpPr>
+      <p:sp>
+        <p:nvSpPr>
+          <p:cNvPr id="2" name="Titre 1"/>
+          <p:cNvSpPr>
+            <a:spLocks noGrp="1"/>
+          </p:cNvSpPr>
+          <p:nvPr>
+            <p:ph type="title"/>
+          </p:nvPr>
+        </p:nvSpPr>
+        <p:spPr/>
+        <p:txBody>
+          <a:bodyPr/>
+          <a:lstStyle/>
+          <a:p>
+            <a:r>
+              <a:rPr lang="fr-FR" dirty="0" smtClean="0"/>
+              <a:t>Dimensionnement d’une machine virtuelle</a:t>
+            </a:r>
+            <a:endParaRPr lang="fr-FR" dirty="0"/>
+          </a:p>
+        </p:txBody>
+      </p:sp>
+      <mc:AlternateContent xmlns:mc="http://schemas.openxmlformats.org/markup-compatibility/2006">
+        <mc:Choice xmlns:a14="http://schemas.microsoft.com/office/drawing/2010/main" Requires="a14">
+          <p:sp>
+            <p:nvSpPr>
+              <p:cNvPr id="3" name="Espace réservé du texte 2"/>
+              <p:cNvSpPr>
+                <a:spLocks noGrp="1"/>
+              </p:cNvSpPr>
+              <p:nvPr>
+                <p:ph type="body" sz="quarter" idx="14"/>
+              </p:nvPr>
+            </p:nvSpPr>
+            <p:spPr/>
+            <p:txBody>
+              <a:bodyPr/>
+              <a:lstStyle/>
+              <a:p>
+                <a:pPr>
+                  <a:buFontTx/>
+                  <a:buChar char="-"/>
+                </a:pPr>
+                <a:r>
+                  <a:rPr lang="fr-FR" dirty="0" smtClean="0"/>
+                  <a:t>Choisir le nombre de Processeurs Virtuels (</a:t>
+                </a:r>
+                <a:r>
+                  <a:rPr lang="fr-FR" dirty="0" err="1" smtClean="0"/>
+                  <a:t>vCPU</a:t>
+                </a:r>
+                <a:r>
+                  <a:rPr lang="fr-FR" dirty="0" smtClean="0"/>
+                  <a:t>)</a:t>
+                </a:r>
+              </a:p>
+              <a:p>
+                <a:pPr>
+                  <a:buFontTx/>
+                  <a:buChar char="-"/>
+                </a:pPr>
+                <a:r>
+                  <a:rPr lang="fr-FR" dirty="0" smtClean="0"/>
+                  <a:t>Choisir la quantité de mémoire</a:t>
+                </a:r>
+              </a:p>
+              <a:p>
+                <a:pPr>
+                  <a:buFontTx/>
+                  <a:buChar char="-"/>
+                </a:pPr>
+                <a:r>
+                  <a:rPr lang="fr-FR" dirty="0" smtClean="0"/>
+                  <a:t>Choisir le type et nombre de GPU à utiliser</a:t>
+                </a:r>
+              </a:p>
+              <a:p>
+                <a:pPr>
+                  <a:buFontTx/>
+                  <a:buChar char="-"/>
+                </a:pPr>
+                <a:endParaRPr lang="fr-FR" dirty="0"/>
+              </a:p>
+              <a:p>
+                <a:pPr marL="0" indent="0">
+                  <a:buNone/>
+                </a:pPr>
+                <a:endParaRPr lang="fr-FR" dirty="0" smtClean="0"/>
+              </a:p>
+              <a:p>
+                <a:pPr marL="0" indent="0">
+                  <a:buNone/>
+                </a:pPr>
+                <a:r>
+                  <a:rPr lang="fr-FR" dirty="0" smtClean="0"/>
+                  <a:t>Estimer le nombre moyen de requêtes concourantes :</a:t>
+                </a:r>
+              </a:p>
+              <a:p>
+                <a:pPr>
+                  <a:buFontTx/>
+                  <a:buChar char="-"/>
+                </a:pPr>
+                <a14:m>
+                  <m:oMath xmlns:m="http://schemas.openxmlformats.org/officeDocument/2006/math">
+                    <m:sSub>
+                      <m:sSubPr>
+                        <m:ctrlPr>
+                          <a:rPr lang="fr-FR" b="0" i="1" smtClean="0">
+                            <a:latin typeface="Cambria Math" panose="02040503050406030204" pitchFamily="18" charset="0"/>
+                          </a:rPr>
+                        </m:ctrlPr>
+                      </m:sSubPr>
+                      <m:e>
+                        <m:r>
+                          <a:rPr lang="fr-FR" b="0" i="1" smtClean="0">
+                            <a:latin typeface="Cambria Math" panose="02040503050406030204" pitchFamily="18" charset="0"/>
+                          </a:rPr>
+                          <m:t>𝑛</m:t>
+                        </m:r>
+                      </m:e>
+                      <m:sub>
+                        <m:r>
+                          <a:rPr lang="fr-FR" b="0" i="1" smtClean="0">
+                            <a:latin typeface="Cambria Math" panose="02040503050406030204" pitchFamily="18" charset="0"/>
+                          </a:rPr>
+                          <m:t>𝑐𝑜𝑛𝑐𝑢𝑟𝑟𝑒𝑛𝑡</m:t>
+                        </m:r>
+                      </m:sub>
+                    </m:sSub>
+                    <m:r>
+                      <a:rPr lang="fr-FR" b="0" i="1" smtClean="0">
+                        <a:latin typeface="Cambria Math" panose="02040503050406030204" pitchFamily="18" charset="0"/>
+                      </a:rPr>
+                      <m:t>=</m:t>
+                    </m:r>
+                    <m:f>
+                      <m:fPr>
+                        <m:ctrlPr>
+                          <a:rPr lang="fr-FR" b="0" i="1" smtClean="0">
+                            <a:latin typeface="Cambria Math" panose="02040503050406030204" pitchFamily="18" charset="0"/>
+                          </a:rPr>
+                        </m:ctrlPr>
+                      </m:fPr>
+                      <m:num>
+                        <m:r>
+                          <a:rPr lang="fr-FR" b="0" i="1" smtClean="0">
+                            <a:latin typeface="Cambria Math" panose="02040503050406030204" pitchFamily="18" charset="0"/>
+                          </a:rPr>
+                          <m:t>𝑞𝑢𝑒𝑟𝑦</m:t>
+                        </m:r>
+                        <m:r>
+                          <a:rPr lang="fr-FR" b="0" i="1" smtClean="0">
+                            <a:latin typeface="Cambria Math" panose="02040503050406030204" pitchFamily="18" charset="0"/>
+                          </a:rPr>
+                          <m:t> </m:t>
+                        </m:r>
+                        <m:r>
+                          <a:rPr lang="fr-FR" b="0" i="1" smtClean="0">
+                            <a:latin typeface="Cambria Math" panose="02040503050406030204" pitchFamily="18" charset="0"/>
+                          </a:rPr>
+                          <m:t>𝑝𝑒𝑟</m:t>
+                        </m:r>
+                        <m:r>
+                          <a:rPr lang="fr-FR" b="0" i="1" smtClean="0">
+                            <a:latin typeface="Cambria Math" panose="02040503050406030204" pitchFamily="18" charset="0"/>
+                          </a:rPr>
+                          <m:t> </m:t>
+                        </m:r>
+                        <m:r>
+                          <a:rPr lang="fr-FR" b="0" i="1" smtClean="0">
+                            <a:latin typeface="Cambria Math" panose="02040503050406030204" pitchFamily="18" charset="0"/>
+                          </a:rPr>
+                          <m:t>𝑠𝑒𝑐𝑜𝑛𝑑𝑠</m:t>
+                        </m:r>
+                      </m:num>
+                      <m:den>
+                        <m:r>
+                          <a:rPr lang="fr-FR" b="0" i="1" smtClean="0">
+                            <a:latin typeface="Cambria Math" panose="02040503050406030204" pitchFamily="18" charset="0"/>
+                          </a:rPr>
+                          <m:t>𝑎𝑣𝑒𝑟𝑎𝑔𝑒</m:t>
+                        </m:r>
+                        <m:r>
+                          <a:rPr lang="fr-FR" b="0" i="1" smtClean="0">
+                            <a:latin typeface="Cambria Math" panose="02040503050406030204" pitchFamily="18" charset="0"/>
+                          </a:rPr>
+                          <m:t> </m:t>
+                        </m:r>
+                        <m:r>
+                          <a:rPr lang="fr-FR" b="0" i="1" smtClean="0">
+                            <a:latin typeface="Cambria Math" panose="02040503050406030204" pitchFamily="18" charset="0"/>
+                          </a:rPr>
+                          <m:t>𝑙𝑎𝑡𝑒𝑛𝑐𝑦</m:t>
+                        </m:r>
+                      </m:den>
+                    </m:f>
+                  </m:oMath>
+                </a14:m>
+                <a:endParaRPr lang="fr-FR" dirty="0" smtClean="0"/>
+              </a:p>
+              <a:p>
+                <a:pPr>
+                  <a:buFontTx/>
+                  <a:buChar char="-"/>
+                </a:pPr>
+                <a:endParaRPr lang="fr-FR" dirty="0"/>
+              </a:p>
+              <a:p>
+                <a:pPr marL="0" indent="0">
+                  <a:buNone/>
+                </a:pPr>
+                <a:r>
+                  <a:rPr lang="fr-FR" dirty="0"/>
+                  <a:t>https://github.com/GoogleCloudPlatform/vertex-ai-samples/blob/main/notebooks/community/vertex_endpoints/find_ideal_machine_type/find_ideal_machine_type.ipynb</a:t>
+                </a:r>
+              </a:p>
+              <a:p>
+                <a:pPr marL="0" indent="0">
+                  <a:buNone/>
+                </a:pPr>
+                <a:endParaRPr lang="fr-FR" dirty="0" smtClean="0"/>
+              </a:p>
+            </p:txBody>
+          </p:sp>
+        </mc:Choice>
+        <mc:Fallback>
+          <p:sp>
+            <p:nvSpPr>
+              <p:cNvPr id="3" name="Espace réservé du texte 2"/>
+              <p:cNvSpPr>
+                <a:spLocks noGrp="1" noRot="1" noChangeAspect="1" noMove="1" noResize="1" noEditPoints="1" noAdjustHandles="1" noChangeArrowheads="1" noChangeShapeType="1" noTextEdit="1"/>
+              </p:cNvSpPr>
+              <p:nvPr>
+                <p:ph type="body" sz="quarter" idx="14"/>
+              </p:nvPr>
+            </p:nvSpPr>
+            <p:spPr>
+              <a:blipFill>
+                <a:blip r:embed="rId2"/>
+                <a:stretch>
+                  <a:fillRect l="-602" t="-1228"/>
+                </a:stretch>
+              </a:blipFill>
+            </p:spPr>
+            <p:txBody>
+              <a:bodyPr/>
+              <a:lstStyle/>
+              <a:p>
+                <a:r>
+                  <a:rPr lang="fr-FR">
+                    <a:noFill/>
+                  </a:rPr>
+                  <a:t> </a:t>
+                </a:r>
+              </a:p>
+            </p:txBody>
+          </p:sp>
+        </mc:Fallback>
+      </mc:AlternateContent>
+      <p:sp>
+        <p:nvSpPr>
+          <p:cNvPr id="4" name="Espace réservé du numéro de diapositive 3"/>
+          <p:cNvSpPr>
+            <a:spLocks noGrp="1"/>
+          </p:cNvSpPr>
+          <p:nvPr>
+            <p:ph type="sldNum" sz="quarter" idx="4"/>
+          </p:nvPr>
+        </p:nvSpPr>
+        <p:spPr/>
+        <p:txBody>
+          <a:bodyPr/>
+          <a:lstStyle/>
+          <a:p>
+            <a:pPr>
+              <a:defRPr/>
+            </a:pPr>
+            <a:fld id="{F4FEB08F-923E-484A-9FC5-0AA7BDA29BD6}" type="slidenum">
+              <a:rPr lang="fr-FR" smtClean="0"/>
+              <a:pPr>
+                <a:defRPr/>
+              </a:pPr>
+              <a:t>6</a:t>
+            </a:fld>
+            <a:endParaRPr lang="fr-FR" dirty="0"/>
+          </a:p>
+        </p:txBody>
+      </p:sp>
+      <p:sp>
+        <p:nvSpPr>
+          <p:cNvPr id="5" name="Espace réservé du pied de page 4"/>
+          <p:cNvSpPr>
+            <a:spLocks noGrp="1"/>
+          </p:cNvSpPr>
+          <p:nvPr>
+            <p:ph type="ftr" sz="quarter" idx="3"/>
+          </p:nvPr>
+        </p:nvSpPr>
+        <p:spPr/>
+        <p:txBody>
+          <a:bodyPr/>
+          <a:lstStyle/>
+          <a:p>
+            <a:r>
+              <a:rPr lang="en-US" smtClean="0"/>
+              <a:t>2024 | ©HeadMind Partners</a:t>
+            </a:r>
+            <a:endParaRPr lang="fr-FR" dirty="0"/>
+          </a:p>
+        </p:txBody>
+      </p:sp>
+    </p:spTree>
+    <p:extLst>
+      <p:ext uri="{BB962C8B-B14F-4D97-AF65-F5344CB8AC3E}">
+        <p14:creationId xmlns:p14="http://schemas.microsoft.com/office/powerpoint/2010/main" val="1132296694"/>
+      </p:ext>
+    </p:extLst>
+  </p:cSld>
+  <p:clrMapOvr>
+    <a:masterClrMapping/>
+  </p:clrMapOvr>
+</p:sld>
+</file>
+
+<file path=ppt/slides/slide7.xml><?xml version="1.0" encoding="utf-8"?>
+<p:sld xmlns:a="http://schemas.openxmlformats.org/drawingml/2006/main" xmlns:r="http://schemas.openxmlformats.org/officeDocument/2006/relationships" xmlns:p="http://schemas.openxmlformats.org/presentationml/2006/main">
+  <p:cSld>
+    <p:spTree>
+      <p:nvGrpSpPr>
+        <p:cNvPr id="1" name=""/>
+        <p:cNvGrpSpPr/>
+        <p:nvPr/>
+      </p:nvGrpSpPr>
+      <p:grpSpPr>
+        <a:xfrm>
+          <a:off x="0" y="0"/>
+          <a:ext cx="0" cy="0"/>
+          <a:chOff x="0" y="0"/>
+          <a:chExt cx="0" cy="0"/>
+        </a:xfrm>
+      </p:grpSpPr>
+      <p:sp>
+        <p:nvSpPr>
+          <p:cNvPr id="2" name="Titre 1"/>
+          <p:cNvSpPr>
+            <a:spLocks noGrp="1"/>
+          </p:cNvSpPr>
+          <p:nvPr>
+            <p:ph type="title"/>
+          </p:nvPr>
+        </p:nvSpPr>
+        <p:spPr/>
+        <p:txBody>
+          <a:bodyPr/>
+          <a:lstStyle/>
+          <a:p>
+            <a:r>
+              <a:rPr lang="fr-FR" dirty="0" smtClean="0"/>
+              <a:t>Les instances « spot »</a:t>
+            </a:r>
+            <a:endParaRPr lang="fr-FR" dirty="0"/>
+          </a:p>
+        </p:txBody>
+      </p:sp>
+      <p:sp>
+        <p:nvSpPr>
+          <p:cNvPr id="3" name="Espace réservé du texte 2"/>
+          <p:cNvSpPr>
+            <a:spLocks noGrp="1"/>
+          </p:cNvSpPr>
+          <p:nvPr>
+            <p:ph type="body" sz="quarter" idx="14"/>
+          </p:nvPr>
+        </p:nvSpPr>
+        <p:spPr/>
+        <p:txBody>
+          <a:bodyPr/>
+          <a:lstStyle/>
+          <a:p>
+            <a:pPr marL="0" indent="0">
+              <a:buNone/>
+            </a:pPr>
+            <a:r>
+              <a:rPr lang="fr-FR" dirty="0" smtClean="0"/>
+              <a:t>Les instances « spot » permettent de réaliser des calculs à grande échelle à des prix très réduit (Jusqu’à 90% moins cher). En revanche, leur disponibilité continue n’est pas assurée et des interruptions dans les calculs peuvent provoquer des pertes de données. </a:t>
+            </a:r>
+          </a:p>
+          <a:p>
+            <a:pPr>
+              <a:buFontTx/>
+              <a:buChar char="-"/>
+            </a:pPr>
+            <a:r>
+              <a:rPr lang="fr-FR" dirty="0" smtClean="0"/>
+              <a:t>Seulement pour des jobs tolérants aux </a:t>
+            </a:r>
+            <a:r>
+              <a:rPr lang="fr-FR" dirty="0" smtClean="0"/>
+              <a:t>pannes</a:t>
+            </a:r>
+          </a:p>
+          <a:p>
+            <a:pPr>
+              <a:buFontTx/>
+              <a:buChar char="-"/>
+            </a:pPr>
+            <a:endParaRPr lang="fr-FR" dirty="0"/>
+          </a:p>
+          <a:p>
+            <a:pPr marL="0" indent="0">
+              <a:buNone/>
+            </a:pPr>
+            <a:endParaRPr lang="fr-FR" dirty="0" smtClean="0"/>
+          </a:p>
+        </p:txBody>
+      </p:sp>
+      <p:sp>
+        <p:nvSpPr>
+          <p:cNvPr id="4" name="Espace réservé du numéro de diapositive 3"/>
+          <p:cNvSpPr>
+            <a:spLocks noGrp="1"/>
+          </p:cNvSpPr>
+          <p:nvPr>
+            <p:ph type="sldNum" sz="quarter" idx="4"/>
+          </p:nvPr>
+        </p:nvSpPr>
+        <p:spPr/>
+        <p:txBody>
+          <a:bodyPr/>
+          <a:lstStyle/>
+          <a:p>
+            <a:pPr>
+              <a:defRPr/>
+            </a:pPr>
+            <a:fld id="{F4FEB08F-923E-484A-9FC5-0AA7BDA29BD6}" type="slidenum">
+              <a:rPr lang="fr-FR" smtClean="0"/>
+              <a:pPr>
+                <a:defRPr/>
+              </a:pPr>
+              <a:t>7</a:t>
+            </a:fld>
+            <a:endParaRPr lang="fr-FR" dirty="0"/>
+          </a:p>
+        </p:txBody>
+      </p:sp>
+      <p:sp>
+        <p:nvSpPr>
+          <p:cNvPr id="5" name="Espace réservé du pied de page 4"/>
+          <p:cNvSpPr>
+            <a:spLocks noGrp="1"/>
+          </p:cNvSpPr>
+          <p:nvPr>
+            <p:ph type="ftr" sz="quarter" idx="3"/>
+          </p:nvPr>
+        </p:nvSpPr>
+        <p:spPr/>
+        <p:txBody>
+          <a:bodyPr/>
+          <a:lstStyle/>
+          <a:p>
+            <a:r>
+              <a:rPr lang="en-US" smtClean="0"/>
+              <a:t>2024 | ©HeadMind Partners</a:t>
+            </a:r>
+            <a:endParaRPr lang="fr-FR" dirty="0"/>
+          </a:p>
+        </p:txBody>
+      </p:sp>
+    </p:spTree>
+    <p:extLst>
+      <p:ext uri="{BB962C8B-B14F-4D97-AF65-F5344CB8AC3E}">
+        <p14:creationId xmlns:p14="http://schemas.microsoft.com/office/powerpoint/2010/main" val="3385198022"/>
+      </p:ext>
+    </p:extLst>
+  </p:cSld>
+  <p:clrMapOvr>
+    <a:masterClrMapping/>
+  </p:clrMapOvr>
+</p:sld>
+</file>
+
+<file path=ppt/slides/slide8.xml><?xml version="1.0" encoding="utf-8"?>
+<p:sld xmlns:a="http://schemas.openxmlformats.org/drawingml/2006/main" xmlns:r="http://schemas.openxmlformats.org/officeDocument/2006/relationships" xmlns:p="http://schemas.openxmlformats.org/presentationml/2006/main">
+  <p:cSld>
+    <p:spTree>
+      <p:nvGrpSpPr>
+        <p:cNvPr id="1" name=""/>
+        <p:cNvGrpSpPr/>
+        <p:nvPr/>
+      </p:nvGrpSpPr>
+      <p:grpSpPr>
+        <a:xfrm>
+          <a:off x="0" y="0"/>
+          <a:ext cx="0" cy="0"/>
+          <a:chOff x="0" y="0"/>
+          <a:chExt cx="0" cy="0"/>
+        </a:xfrm>
+      </p:grpSpPr>
+      <p:sp>
+        <p:nvSpPr>
+          <p:cNvPr id="2" name="Titre 1"/>
+          <p:cNvSpPr>
+            <a:spLocks noGrp="1"/>
+          </p:cNvSpPr>
+          <p:nvPr>
+            <p:ph type="title"/>
+          </p:nvPr>
+        </p:nvSpPr>
+        <p:spPr/>
+        <p:txBody>
+          <a:bodyPr/>
+          <a:lstStyle/>
+          <a:p>
+            <a:r>
+              <a:rPr lang="fr-FR" dirty="0" smtClean="0"/>
+              <a:t>A/B </a:t>
+            </a:r>
+            <a:r>
+              <a:rPr lang="fr-FR" dirty="0" err="1" smtClean="0"/>
+              <a:t>testing</a:t>
+            </a:r>
+            <a:endParaRPr lang="fr-FR" dirty="0"/>
+          </a:p>
+        </p:txBody>
+      </p:sp>
+      <p:sp>
+        <p:nvSpPr>
+          <p:cNvPr id="4" name="Espace réservé du numéro de diapositive 3"/>
+          <p:cNvSpPr>
+            <a:spLocks noGrp="1"/>
+          </p:cNvSpPr>
+          <p:nvPr>
+            <p:ph type="sldNum" sz="quarter" idx="4"/>
+          </p:nvPr>
+        </p:nvSpPr>
+        <p:spPr/>
+        <p:txBody>
+          <a:bodyPr/>
+          <a:lstStyle/>
+          <a:p>
+            <a:pPr>
+              <a:defRPr/>
+            </a:pPr>
+            <a:fld id="{F4FEB08F-923E-484A-9FC5-0AA7BDA29BD6}" type="slidenum">
+              <a:rPr lang="fr-FR" smtClean="0"/>
+              <a:pPr>
+                <a:defRPr/>
+              </a:pPr>
+              <a:t>8</a:t>
+            </a:fld>
+            <a:endParaRPr lang="fr-FR" dirty="0"/>
+          </a:p>
+        </p:txBody>
+      </p:sp>
+      <p:sp>
+        <p:nvSpPr>
+          <p:cNvPr id="5" name="Espace réservé du pied de page 4"/>
+          <p:cNvSpPr>
+            <a:spLocks noGrp="1"/>
+          </p:cNvSpPr>
+          <p:nvPr>
+            <p:ph type="ftr" sz="quarter" idx="3"/>
+          </p:nvPr>
+        </p:nvSpPr>
+        <p:spPr/>
+        <p:txBody>
+          <a:bodyPr/>
+          <a:lstStyle/>
+          <a:p>
+            <a:r>
+              <a:rPr lang="en-US" smtClean="0"/>
+              <a:t>2024 | ©HeadMind Partners</a:t>
+            </a:r>
+            <a:endParaRPr lang="fr-FR" dirty="0"/>
+          </a:p>
+        </p:txBody>
+      </p:sp>
+      <p:pic>
+        <p:nvPicPr>
+          <p:cNvPr id="1026" name="Picture 2" descr="https://www.zentao.pm/file.php?f=zentaopm/202305/f_ec1801afe94c02a11063fc991d274692&amp;t=png&amp;o=&amp;s=&amp;v=1683718997"/>
+          <p:cNvPicPr>
+            <a:picLocks noChangeAspect="1" noChangeArrowheads="1"/>
+          </p:cNvPicPr>
+          <p:nvPr/>
+        </p:nvPicPr>
+        <p:blipFill>
+          <a:blip r:embed="rId2">
+            <a:extLst>
+              <a:ext uri="{28A0092B-C50C-407E-A947-70E740481C1C}">
+                <a14:useLocalDpi xmlns:a14="http://schemas.microsoft.com/office/drawing/2010/main" val="0"/>
+              </a:ext>
+            </a:extLst>
+          </a:blip>
+          <a:srcRect/>
+          <a:stretch>
+            <a:fillRect/>
+          </a:stretch>
+        </p:blipFill>
+        <p:spPr bwMode="auto">
+          <a:xfrm>
+            <a:off x="2132447" y="1172039"/>
+            <a:ext cx="7911966" cy="5316730"/>
+          </a:xfrm>
+          <a:prstGeom prst="rect">
+            <a:avLst/>
+          </a:prstGeom>
+          <a:noFill/>
+          <a:extLst>
+            <a:ext uri="{909E8E84-426E-40DD-AFC4-6F175D3DCCD1}">
+              <a14:hiddenFill xmlns:a14="http://schemas.microsoft.com/office/drawing/2010/main">
+                <a:solidFill>
+                  <a:srgbClr val="FFFFFF"/>
+                </a:solidFill>
+              </a14:hiddenFill>
+            </a:ext>
+          </a:extLst>
+        </p:spPr>
+      </p:pic>
+    </p:spTree>
+    <p:extLst>
+      <p:ext uri="{BB962C8B-B14F-4D97-AF65-F5344CB8AC3E}">
+        <p14:creationId xmlns:p14="http://schemas.microsoft.com/office/powerpoint/2010/main" val="1526616411"/>
       </p:ext>
     </p:extLst>
   </p:cSld>

</xml_diff>

<commit_message>
Refactor du notebook, amélioration des slides
</commit_message>
<xml_diff>
--- a/slides/3_model-endpoints/3-Train and deploy ML models.pptx
+++ b/slides/3_model-endpoints/3-Train and deploy ML models.pptx
@@ -207,7 +207,7 @@
           <a:p>
             <a:fld id="{9357E7CD-833A-4057-A34F-721214C10A5F}" type="datetimeFigureOut">
               <a:rPr lang="fr-FR" smtClean="0"/>
-              <a:t>14/02/2025</a:t>
+              <a:t>21/02/2025</a:t>
             </a:fld>
             <a:endParaRPr lang="fr-FR"/>
           </a:p>
@@ -12983,7 +12983,6 @@
               <a:rPr lang="fr-FR" dirty="0"/>
               <a:t>Inférence par batch vs streaming</a:t>
             </a:r>
-            <a:endParaRPr lang="fr-FR" dirty="0"/>
           </a:p>
         </p:txBody>
       </p:sp>
@@ -13488,7 +13487,117 @@
           <a:bodyPr/>
           <a:lstStyle/>
           <a:p>
-            <a:endParaRPr lang="fr-FR"/>
+            <a:pPr marL="0" indent="0">
+              <a:buNone/>
+            </a:pPr>
+            <a:r>
+              <a:rPr lang="fr-FR" b="1" dirty="0" smtClean="0"/>
+              <a:t>Pourquoi utiliser un service d’entrainement plutôt que de simplement faire tourner ses notebooks?</a:t>
+            </a:r>
+          </a:p>
+          <a:p>
+            <a:pPr marL="0" indent="0">
+              <a:buNone/>
+            </a:pPr>
+            <a:endParaRPr lang="fr-FR" dirty="0" smtClean="0"/>
+          </a:p>
+          <a:p>
+            <a:pPr marL="0" indent="0">
+              <a:buNone/>
+            </a:pPr>
+            <a:endParaRPr lang="fr-FR" dirty="0"/>
+          </a:p>
+          <a:p>
+            <a:pPr marL="0" indent="0">
+              <a:buNone/>
+            </a:pPr>
+            <a:endParaRPr lang="fr-FR" dirty="0" smtClean="0"/>
+          </a:p>
+          <a:p>
+            <a:pPr marL="0" indent="0">
+              <a:buNone/>
+            </a:pPr>
+            <a:endParaRPr lang="fr-FR" dirty="0" smtClean="0"/>
+          </a:p>
+          <a:p>
+            <a:pPr marL="0" indent="0">
+              <a:buNone/>
+            </a:pPr>
+            <a:endParaRPr lang="fr-FR" dirty="0"/>
+          </a:p>
+          <a:p>
+            <a:pPr marL="0" indent="0">
+              <a:buNone/>
+            </a:pPr>
+            <a:endParaRPr lang="fr-FR" dirty="0" smtClean="0"/>
+          </a:p>
+          <a:p>
+            <a:pPr marL="0" indent="0">
+              <a:buNone/>
+            </a:pPr>
+            <a:r>
+              <a:rPr lang="fr-FR" dirty="0" smtClean="0"/>
+              <a:t>Étapes à suivre: </a:t>
+            </a:r>
+            <a:endParaRPr lang="fr-FR" dirty="0" smtClean="0"/>
+          </a:p>
+          <a:p>
+            <a:pPr marL="0" indent="0">
+              <a:buNone/>
+            </a:pPr>
+            <a:r>
+              <a:rPr lang="fr-FR" dirty="0" smtClean="0"/>
+              <a:t>1)</a:t>
+            </a:r>
+            <a:r>
+              <a:rPr lang="fr-FR" dirty="0" smtClean="0"/>
+              <a:t> Configurer </a:t>
+            </a:r>
+            <a:r>
+              <a:rPr lang="fr-FR" dirty="0" smtClean="0"/>
+              <a:t>les accès aux cloud </a:t>
+            </a:r>
+            <a:r>
+              <a:rPr lang="fr-FR" dirty="0" err="1" smtClean="0"/>
+              <a:t>storages</a:t>
+            </a:r>
+            <a:endParaRPr lang="fr-FR" dirty="0"/>
+          </a:p>
+          <a:p>
+            <a:pPr marL="0" indent="0">
+              <a:buNone/>
+            </a:pPr>
+            <a:r>
+              <a:rPr lang="fr-FR" dirty="0" smtClean="0"/>
+              <a:t>2) Conteneuriser </a:t>
+            </a:r>
+            <a:r>
+              <a:rPr lang="fr-FR" dirty="0" smtClean="0"/>
+              <a:t>le code </a:t>
+            </a:r>
+          </a:p>
+          <a:p>
+            <a:pPr marL="0" indent="0">
+              <a:buNone/>
+            </a:pPr>
+            <a:r>
+              <a:rPr lang="fr-FR" dirty="0" smtClean="0"/>
+              <a:t>3)</a:t>
+            </a:r>
+            <a:r>
+              <a:rPr lang="fr-FR" dirty="0" smtClean="0"/>
+              <a:t> Configurer </a:t>
+            </a:r>
+            <a:r>
+              <a:rPr lang="fr-FR" dirty="0" smtClean="0"/>
+              <a:t>le lancement des jobs d’entrainement</a:t>
+            </a:r>
+          </a:p>
+          <a:p>
+            <a:pPr marL="0" indent="0">
+              <a:buNone/>
+            </a:pPr>
+            <a:endParaRPr lang="fr-FR" dirty="0"/>
           </a:p>
         </p:txBody>
       </p:sp>
@@ -13541,6 +13650,111 @@
               <a:t>2024 | ©HeadMind Partners</a:t>
             </a:r>
             <a:endParaRPr lang="fr-FR" dirty="0"/>
+          </a:p>
+        </p:txBody>
+      </p:sp>
+      <p:pic>
+        <p:nvPicPr>
+          <p:cNvPr id="6" name="Image 5"/>
+          <p:cNvPicPr>
+            <a:picLocks noChangeAspect="1"/>
+          </p:cNvPicPr>
+          <p:nvPr/>
+        </p:nvPicPr>
+        <p:blipFill>
+          <a:blip r:embed="rId2"/>
+          <a:stretch>
+            <a:fillRect/>
+          </a:stretch>
+        </p:blipFill>
+        <p:spPr>
+          <a:xfrm>
+            <a:off x="2541270" y="1996440"/>
+            <a:ext cx="571500" cy="571500"/>
+          </a:xfrm>
+          <a:prstGeom prst="rect">
+            <a:avLst/>
+          </a:prstGeom>
+        </p:spPr>
+      </p:pic>
+      <p:pic>
+        <p:nvPicPr>
+          <p:cNvPr id="7" name="Image 6"/>
+          <p:cNvPicPr>
+            <a:picLocks noChangeAspect="1"/>
+          </p:cNvPicPr>
+          <p:nvPr/>
+        </p:nvPicPr>
+        <p:blipFill>
+          <a:blip r:embed="rId3"/>
+          <a:stretch>
+            <a:fillRect/>
+          </a:stretch>
+        </p:blipFill>
+        <p:spPr>
+          <a:xfrm>
+            <a:off x="9010650" y="1954952"/>
+            <a:ext cx="701040" cy="701040"/>
+          </a:xfrm>
+          <a:prstGeom prst="rect">
+            <a:avLst/>
+          </a:prstGeom>
+        </p:spPr>
+      </p:pic>
+      <p:sp>
+        <p:nvSpPr>
+          <p:cNvPr id="8" name="ZoneTexte 7"/>
+          <p:cNvSpPr txBox="1"/>
+          <p:nvPr/>
+        </p:nvSpPr>
+        <p:spPr>
+          <a:xfrm>
+            <a:off x="-293370" y="2670810"/>
+            <a:ext cx="12618720" cy="1200329"/>
+          </a:xfrm>
+          <a:prstGeom prst="rect">
+            <a:avLst/>
+          </a:prstGeom>
+          <a:noFill/>
+        </p:spPr>
+        <p:txBody>
+          <a:bodyPr wrap="square" numCol="2" rtlCol="0">
+            <a:spAutoFit/>
+          </a:bodyPr>
+          <a:lstStyle/>
+          <a:p>
+            <a:pPr algn="ctr"/>
+            <a:r>
+              <a:rPr lang="fr-FR" i="1" dirty="0"/>
+              <a:t>Modèles qui prennent du temps à s’entrainer</a:t>
+            </a:r>
+          </a:p>
+          <a:p>
+            <a:pPr algn="ctr"/>
+            <a:endParaRPr lang="fr-FR" i="1" dirty="0" smtClean="0"/>
+          </a:p>
+          <a:p>
+            <a:pPr algn="ctr"/>
+            <a:endParaRPr lang="fr-FR" i="1" dirty="0"/>
+          </a:p>
+          <a:p>
+            <a:pPr algn="ctr"/>
+            <a:endParaRPr lang="fr-FR" i="1" dirty="0" smtClean="0"/>
+          </a:p>
+          <a:p>
+            <a:pPr algn="ctr"/>
+            <a:r>
+              <a:rPr lang="fr-FR" i="1" dirty="0" smtClean="0"/>
+              <a:t>Modèles </a:t>
+            </a:r>
+            <a:r>
+              <a:rPr lang="fr-FR" i="1" dirty="0"/>
+              <a:t>qui nécessitent un réentrainement fréquent sur de nouvelles données</a:t>
+            </a:r>
+          </a:p>
+          <a:p>
+            <a:pPr algn="ctr"/>
+            <a:endParaRPr lang="fr-FR" i="1" dirty="0"/>
           </a:p>
         </p:txBody>
       </p:sp>
@@ -13661,8 +13875,8 @@
         </p:nvSpPr>
         <p:spPr>
           <a:xfrm>
-            <a:off x="818228" y="2189022"/>
-            <a:ext cx="4557487" cy="3788266"/>
+            <a:off x="818228" y="2845802"/>
+            <a:ext cx="4557487" cy="3132088"/>
           </a:xfrm>
         </p:spPr>
         <p:txBody>
@@ -13702,14 +13916,12 @@
             </a:pPr>
             <a:r>
               <a:rPr lang="fr-FR" dirty="0" smtClean="0"/>
-              <a:t>Entraine des latences à l’inférence.</a:t>
-            </a:r>
-            <a:endParaRPr lang="fr-FR" dirty="0"/>
-          </a:p>
-          <a:p>
-            <a:endParaRPr lang="fr-FR" dirty="0" smtClean="0"/>
-          </a:p>
-          <a:p>
+              <a:t>Entraine des latences à l’inférence</a:t>
+            </a:r>
+            <a:r>
+              <a:rPr lang="fr-FR" dirty="0" smtClean="0"/>
+              <a:t>.</a:t>
+            </a:r>
             <a:endParaRPr lang="fr-FR" dirty="0" smtClean="0"/>
           </a:p>
           <a:p>
@@ -13728,11 +13940,7 @@
           <a:p>
             <a:r>
               <a:rPr lang="fr-FR" dirty="0" smtClean="0"/>
-              <a:t>Classification d’images, </a:t>
-            </a:r>
-            <a:r>
-              <a:rPr lang="fr-FR" dirty="0" smtClean="0"/>
-              <a:t>réglage d’</a:t>
+              <a:t>Classification d’images, réglage d’</a:t>
             </a:r>
             <a:r>
               <a:rPr lang="fr-FR" dirty="0" err="1" smtClean="0"/>
@@ -13774,7 +13982,12 @@
             <p:ph type="body" sz="quarter" idx="19"/>
           </p:nvPr>
         </p:nvSpPr>
-        <p:spPr/>
+        <p:spPr>
+          <a:xfrm>
+            <a:off x="6612146" y="2845802"/>
+            <a:ext cx="4557487" cy="3131486"/>
+          </a:xfrm>
+        </p:spPr>
         <p:txBody>
           <a:bodyPr/>
           <a:lstStyle/>
@@ -13812,11 +14025,7 @@
             </a:r>
             <a:r>
               <a:rPr lang="fr-FR" dirty="0" smtClean="0"/>
-              <a:t> </a:t>
-            </a:r>
-            <a:r>
-              <a:rPr lang="fr-FR" dirty="0" smtClean="0"/>
-              <a:t>efficace</a:t>
+              <a:t> efficace</a:t>
             </a:r>
           </a:p>
           <a:p>
@@ -13830,24 +14039,6 @@
             </a:r>
           </a:p>
           <a:p>
-            <a:pPr marL="285750" indent="-285750">
-              <a:buFontTx/>
-              <a:buChar char="-"/>
-            </a:pPr>
-            <a:endParaRPr lang="fr-FR" dirty="0"/>
-          </a:p>
-          <a:p>
-            <a:pPr marL="285750" indent="-285750">
-              <a:buFontTx/>
-              <a:buChar char="-"/>
-            </a:pPr>
-            <a:endParaRPr lang="fr-FR" dirty="0" smtClean="0"/>
-          </a:p>
-          <a:p>
-            <a:pPr marL="285750" indent="-285750">
-              <a:buFontTx/>
-              <a:buChar char="-"/>
-            </a:pPr>
             <a:endParaRPr lang="fr-FR" dirty="0"/>
           </a:p>
           <a:p>
@@ -13892,6 +14083,54 @@
           </a:p>
         </p:txBody>
       </p:sp>
+      <p:pic>
+        <p:nvPicPr>
+          <p:cNvPr id="9" name="Image 8"/>
+          <p:cNvPicPr>
+            <a:picLocks noChangeAspect="1"/>
+          </p:cNvPicPr>
+          <p:nvPr/>
+        </p:nvPicPr>
+        <p:blipFill>
+          <a:blip r:embed="rId2"/>
+          <a:stretch>
+            <a:fillRect/>
+          </a:stretch>
+        </p:blipFill>
+        <p:spPr>
+          <a:xfrm>
+            <a:off x="2567940" y="2069249"/>
+            <a:ext cx="735330" cy="735330"/>
+          </a:xfrm>
+          <a:prstGeom prst="rect">
+            <a:avLst/>
+          </a:prstGeom>
+        </p:spPr>
+      </p:pic>
+      <p:pic>
+        <p:nvPicPr>
+          <p:cNvPr id="10" name="Image 9"/>
+          <p:cNvPicPr>
+            <a:picLocks noChangeAspect="1"/>
+          </p:cNvPicPr>
+          <p:nvPr/>
+        </p:nvPicPr>
+        <p:blipFill>
+          <a:blip r:embed="rId3"/>
+          <a:stretch>
+            <a:fillRect/>
+          </a:stretch>
+        </p:blipFill>
+        <p:spPr>
+          <a:xfrm>
+            <a:off x="8835390" y="2122589"/>
+            <a:ext cx="628650" cy="628650"/>
+          </a:xfrm>
+          <a:prstGeom prst="rect">
+            <a:avLst/>
+          </a:prstGeom>
+        </p:spPr>
+      </p:pic>
     </p:spTree>
     <p:extLst>
       <p:ext uri="{BB962C8B-B14F-4D97-AF65-F5344CB8AC3E}">
@@ -14129,6 +14368,20 @@
                   <a:buFontTx/>
                   <a:buChar char="-"/>
                 </a:pPr>
+                <a:endParaRPr lang="fr-FR" dirty="0" smtClean="0"/>
+              </a:p>
+              <a:p>
+                <a:pPr>
+                  <a:buFontTx/>
+                  <a:buChar char="-"/>
+                </a:pPr>
+                <a:endParaRPr lang="fr-FR" dirty="0"/>
+              </a:p>
+              <a:p>
+                <a:pPr>
+                  <a:buFontTx/>
+                  <a:buChar char="-"/>
+                </a:pPr>
                 <a:endParaRPr lang="fr-FR" dirty="0"/>
               </a:p>
               <a:p>
@@ -14136,7 +14389,7 @@
                   <a:buNone/>
                 </a:pPr>
                 <a:r>
-                  <a:rPr lang="fr-FR" dirty="0"/>
+                  <a:rPr lang="fr-FR" sz="1200" dirty="0"/>
                   <a:t>https://github.com/GoogleCloudPlatform/vertex-ai-samples/blob/main/notebooks/community/vertex_endpoints/find_ideal_machine_type/find_ideal_machine_type.ipynb</a:t>
                 </a:r>
               </a:p>
@@ -14308,7 +14561,7 @@
             </a:pPr>
             <a:r>
               <a:rPr lang="fr-FR" dirty="0" smtClean="0"/>
-              <a:t>Les instances « spot » permettent de réaliser des calculs à grande échelle à des prix très réduit (Jusqu’à 90% moins cher). En revanche, leur disponibilité continue n’est pas assurée et des interruptions dans les calculs peuvent provoquer des pertes de données. </a:t>
+              <a:t>Les instances « spot » permettent de réaliser des calculs à grande échelle à des prix très réduits (Jusqu’à 90% moins cher). En revanche, leur disponibilité continue n’est pas assurée et des interruptions dans les calculs peuvent provoquer des pertes de données. </a:t>
             </a:r>
           </a:p>
           <a:p>
@@ -14318,11 +14571,17 @@
             </a:pPr>
             <a:r>
               <a:rPr lang="fr-FR" dirty="0" smtClean="0"/>
-              <a:t>Seulement pour des jobs tolérants aux </a:t>
-            </a:r>
+              <a:t>Seulement pour des jobs tolérants aux pannes</a:t>
+            </a:r>
+          </a:p>
+          <a:p>
+            <a:pPr>
+              <a:buFontTx/>
+              <a:buChar char="-"/>
+            </a:pPr>
             <a:r>
               <a:rPr lang="fr-FR" dirty="0" smtClean="0"/>
-              <a:t>pannes</a:t>
+              <a:t>Mettre en place des checkpoints dans le code source</a:t>
             </a:r>
           </a:p>
           <a:p>

</xml_diff>

<commit_message>
montée en charge avec locust + questions
</commit_message>
<xml_diff>
--- a/slides/3_model-endpoints/3-Train and deploy ML models.pptx
+++ b/slides/3_model-endpoints/3-Train and deploy ML models.pptx
@@ -207,7 +207,7 @@
           <a:p>
             <a:fld id="{9357E7CD-833A-4057-A34F-721214C10A5F}" type="datetimeFigureOut">
               <a:rPr lang="fr-FR" smtClean="0"/>
-              <a:t>21/02/2025</a:t>
+              <a:t>26/02/2025</a:t>
             </a:fld>
             <a:endParaRPr lang="fr-FR"/>
           </a:p>
@@ -12866,7 +12866,7 @@
           <a:p>
             <a:r>
               <a:rPr lang="fr-FR" dirty="0" smtClean="0"/>
-              <a:t>tuto</a:t>
+              <a:t>Intérêt, fonctionnement</a:t>
             </a:r>
             <a:endParaRPr lang="fr-FR" dirty="0"/>
           </a:p>
@@ -12888,8 +12888,12 @@
           <a:lstStyle/>
           <a:p>
             <a:r>
+              <a:rPr lang="fr-FR" dirty="0"/>
+              <a:t>Intérêt, </a:t>
+            </a:r>
+            <a:r>
               <a:rPr lang="fr-FR" dirty="0" smtClean="0"/>
-              <a:t>tuto</a:t>
+              <a:t>fonctionnement</a:t>
             </a:r>
             <a:endParaRPr lang="fr-FR" dirty="0"/>
           </a:p>
@@ -13056,7 +13060,7 @@
           <a:p>
             <a:r>
               <a:rPr lang="fr-FR" dirty="0" smtClean="0"/>
-              <a:t>tuto</a:t>
+              <a:t>Définition</a:t>
             </a:r>
             <a:endParaRPr lang="fr-FR" dirty="0"/>
           </a:p>
@@ -13104,6 +13108,10 @@
           <a:bodyPr/>
           <a:lstStyle/>
           <a:p>
+            <a:r>
+              <a:rPr lang="fr-FR" smtClean="0"/>
+              <a:t>Définition</a:t>
+            </a:r>
             <a:endParaRPr lang="fr-FR" dirty="0"/>
           </a:p>
         </p:txBody>
@@ -13539,7 +13547,6 @@
               <a:rPr lang="fr-FR" dirty="0" smtClean="0"/>
               <a:t>Étapes à suivre: </a:t>
             </a:r>
-            <a:endParaRPr lang="fr-FR" dirty="0" smtClean="0"/>
           </a:p>
           <a:p>
             <a:pPr marL="0" indent="0">
@@ -13547,15 +13554,7 @@
             </a:pPr>
             <a:r>
               <a:rPr lang="fr-FR" dirty="0" smtClean="0"/>
-              <a:t>1)</a:t>
-            </a:r>
-            <a:r>
-              <a:rPr lang="fr-FR" dirty="0" smtClean="0"/>
-              <a:t> Configurer </a:t>
-            </a:r>
-            <a:r>
-              <a:rPr lang="fr-FR" dirty="0" smtClean="0"/>
-              <a:t>les accès aux cloud </a:t>
+              <a:t>1) Configurer les accès aux cloud </a:t>
             </a:r>
             <a:r>
               <a:rPr lang="fr-FR" dirty="0" err="1" smtClean="0"/>
@@ -13569,11 +13568,7 @@
             </a:pPr>
             <a:r>
               <a:rPr lang="fr-FR" dirty="0" smtClean="0"/>
-              <a:t>2) Conteneuriser </a:t>
-            </a:r>
-            <a:r>
-              <a:rPr lang="fr-FR" dirty="0" smtClean="0"/>
-              <a:t>le code </a:t>
+              <a:t>2) Conteneuriser le code </a:t>
             </a:r>
           </a:p>
           <a:p>
@@ -13582,15 +13577,7 @@
             </a:pPr>
             <a:r>
               <a:rPr lang="fr-FR" dirty="0" smtClean="0"/>
-              <a:t>3)</a:t>
-            </a:r>
-            <a:r>
-              <a:rPr lang="fr-FR" dirty="0" smtClean="0"/>
-              <a:t> Configurer </a:t>
-            </a:r>
-            <a:r>
-              <a:rPr lang="fr-FR" dirty="0" smtClean="0"/>
-              <a:t>le lancement des jobs d’entrainement</a:t>
+              <a:t>3) Configurer le lancement des jobs d’entrainement</a:t>
             </a:r>
           </a:p>
           <a:p>
@@ -13916,13 +13903,8 @@
             </a:pPr>
             <a:r>
               <a:rPr lang="fr-FR" dirty="0" smtClean="0"/>
-              <a:t>Entraine des latences à l’inférence</a:t>
-            </a:r>
-            <a:r>
-              <a:rPr lang="fr-FR" dirty="0" smtClean="0"/>
-              <a:t>.</a:t>
-            </a:r>
-            <a:endParaRPr lang="fr-FR" dirty="0" smtClean="0"/>
+              <a:t>Entraine des latences à l’inférence.</a:t>
+            </a:r>
           </a:p>
           <a:p>
             <a:pPr marL="285750" indent="-285750">
@@ -14184,8 +14166,8 @@
           </a:p>
         </p:txBody>
       </p:sp>
-      <mc:AlternateContent xmlns:mc="http://schemas.openxmlformats.org/markup-compatibility/2006">
-        <mc:Choice xmlns:a14="http://schemas.microsoft.com/office/drawing/2010/main" Requires="a14">
+      <mc:AlternateContent xmlns:mc="http://schemas.openxmlformats.org/markup-compatibility/2006" xmlns:a14="http://schemas.microsoft.com/office/drawing/2010/main">
+        <mc:Choice Requires="a14">
           <p:sp>
             <p:nvSpPr>
               <p:cNvPr id="3" name="Espace réservé du texte 2"/>
@@ -14402,7 +14384,7 @@
             </p:txBody>
           </p:sp>
         </mc:Choice>
-        <mc:Fallback>
+        <mc:Fallback xmlns="">
           <p:sp>
             <p:nvSpPr>
               <p:cNvPr id="3" name="Espace réservé du texte 2"/>

</xml_diff>